<commit_message>
- Updated the Person example XML spec - Updated the Person example search page
git-svn-id: http://gforge.hl7.org/svn/fhir/trunk@535 2f0db536-2c49-4257-a3fa-e771ed206c19
</commit_message>
<xml_diff>
--- a/presentations/2012-Sept/201209 WGM Introduction to FHIR.pptx
+++ b/presentations/2012-Sept/201209 WGM Introduction to FHIR.pptx
@@ -288,7 +288,7 @@
             <a:fld id="{5FA7A704-9F1C-4FD3-85D1-57AF2D7FD0E8}" type="datetimeFigureOut">
               <a:rPr lang="en-US" smtClean="0"/>
               <a:pPr/>
-              <a:t>8/29/2012</a:t>
+              <a:t>9/9/2012</a:t>
             </a:fld>
             <a:endParaRPr lang="en-US" dirty="0"/>
           </a:p>
@@ -694,7 +694,7 @@
             <a:fld id="{D80A4771-C6EF-4B99-81F4-D30BE4E017A0}" type="datetimeFigureOut">
               <a:rPr lang="en-US" smtClean="0"/>
               <a:pPr/>
-              <a:t>8/29/2012</a:t>
+              <a:t>9/9/2012</a:t>
             </a:fld>
             <a:endParaRPr lang="en-US"/>
           </a:p>
@@ -1009,7 +1009,7 @@
             <a:fld id="{D80A4771-C6EF-4B99-81F4-D30BE4E017A0}" type="datetimeFigureOut">
               <a:rPr lang="en-US" smtClean="0"/>
               <a:pPr/>
-              <a:t>8/29/2012</a:t>
+              <a:t>9/9/2012</a:t>
             </a:fld>
             <a:endParaRPr lang="en-US"/>
           </a:p>
@@ -1196,7 +1196,7 @@
             <a:fld id="{D80A4771-C6EF-4B99-81F4-D30BE4E017A0}" type="datetimeFigureOut">
               <a:rPr lang="en-US" smtClean="0"/>
               <a:pPr/>
-              <a:t>8/29/2012</a:t>
+              <a:t>9/9/2012</a:t>
             </a:fld>
             <a:endParaRPr lang="en-US"/>
           </a:p>
@@ -1394,7 +1394,7 @@
             <a:fld id="{D80A4771-C6EF-4B99-81F4-D30BE4E017A0}" type="datetimeFigureOut">
               <a:rPr lang="en-US" smtClean="0"/>
               <a:pPr/>
-              <a:t>8/29/2012</a:t>
+              <a:t>9/9/2012</a:t>
             </a:fld>
             <a:endParaRPr lang="en-US"/>
           </a:p>
@@ -1688,7 +1688,7 @@
             <a:fld id="{D80A4771-C6EF-4B99-81F4-D30BE4E017A0}" type="datetimeFigureOut">
               <a:rPr lang="en-US" smtClean="0"/>
               <a:pPr/>
-              <a:t>8/29/2012</a:t>
+              <a:t>9/9/2012</a:t>
             </a:fld>
             <a:endParaRPr lang="en-US"/>
           </a:p>
@@ -2224,7 +2224,7 @@
             <a:fld id="{D80A4771-C6EF-4B99-81F4-D30BE4E017A0}" type="datetimeFigureOut">
               <a:rPr lang="en-US" smtClean="0"/>
               <a:pPr/>
-              <a:t>8/29/2012</a:t>
+              <a:t>9/9/2012</a:t>
             </a:fld>
             <a:endParaRPr lang="en-US"/>
           </a:p>
@@ -2863,7 +2863,7 @@
             <a:fld id="{D80A4771-C6EF-4B99-81F4-D30BE4E017A0}" type="datetimeFigureOut">
               <a:rPr lang="en-US" smtClean="0"/>
               <a:pPr/>
-              <a:t>8/29/2012</a:t>
+              <a:t>9/9/2012</a:t>
             </a:fld>
             <a:endParaRPr lang="en-US"/>
           </a:p>
@@ -2991,7 +2991,7 @@
             <a:fld id="{D80A4771-C6EF-4B99-81F4-D30BE4E017A0}" type="datetimeFigureOut">
               <a:rPr lang="en-US" smtClean="0"/>
               <a:pPr/>
-              <a:t>8/29/2012</a:t>
+              <a:t>9/9/2012</a:t>
             </a:fld>
             <a:endParaRPr lang="en-US"/>
           </a:p>
@@ -3137,7 +3137,7 @@
             <a:fld id="{D80A4771-C6EF-4B99-81F4-D30BE4E017A0}" type="datetimeFigureOut">
               <a:rPr lang="en-US" smtClean="0"/>
               <a:pPr/>
-              <a:t>8/29/2012</a:t>
+              <a:t>9/9/2012</a:t>
             </a:fld>
             <a:endParaRPr lang="en-US"/>
           </a:p>
@@ -3484,7 +3484,7 @@
             <a:fld id="{D80A4771-C6EF-4B99-81F4-D30BE4E017A0}" type="datetimeFigureOut">
               <a:rPr lang="en-US" smtClean="0"/>
               <a:pPr/>
-              <a:t>8/29/2012</a:t>
+              <a:t>9/9/2012</a:t>
             </a:fld>
             <a:endParaRPr lang="en-US"/>
           </a:p>
@@ -3582,7 +3582,7 @@
             <a:fld id="{D80A4771-C6EF-4B99-81F4-D30BE4E017A0}" type="datetimeFigureOut">
               <a:rPr lang="en-US" smtClean="0"/>
               <a:pPr/>
-              <a:t>8/29/2012</a:t>
+              <a:t>9/9/2012</a:t>
             </a:fld>
             <a:endParaRPr lang="en-US"/>
           </a:p>
@@ -4008,7 +4008,7 @@
             <a:fld id="{D80A4771-C6EF-4B99-81F4-D30BE4E017A0}" type="datetimeFigureOut">
               <a:rPr lang="en-US" smtClean="0"/>
               <a:pPr algn="r"/>
-              <a:t>8/29/2012</a:t>
+              <a:t>9/9/2012</a:t>
             </a:fld>
             <a:endParaRPr lang="en-US" sz="1200">
               <a:solidFill>
@@ -4954,6 +4954,13 @@
   <p:clrMapOvr>
     <a:masterClrMapping/>
   </p:clrMapOvr>
+  <p:timing>
+    <p:tnLst>
+      <p:par>
+        <p:cTn id="1" dur="indefinite" restart="never" nodeType="tmRoot"/>
+      </p:par>
+    </p:tnLst>
+  </p:timing>
 </p:sld>
 </file>
 
@@ -5099,6 +5106,13 @@
   <p:clrMapOvr>
     <a:masterClrMapping/>
   </p:clrMapOvr>
+  <p:timing>
+    <p:tnLst>
+      <p:par>
+        <p:cTn id="1" dur="indefinite" restart="never" nodeType="tmRoot"/>
+      </p:par>
+    </p:tnLst>
+  </p:timing>
 </p:sld>
 </file>
 
@@ -5277,6 +5291,13 @@
   <p:clrMapOvr>
     <a:masterClrMapping/>
   </p:clrMapOvr>
+  <p:timing>
+    <p:tnLst>
+      <p:par>
+        <p:cTn id="1" dur="indefinite" restart="never" nodeType="tmRoot"/>
+      </p:par>
+    </p:tnLst>
+  </p:timing>
 </p:sld>
 </file>
 
@@ -5390,6 +5411,13 @@
   <p:clrMapOvr>
     <a:masterClrMapping/>
   </p:clrMapOvr>
+  <p:timing>
+    <p:tnLst>
+      <p:par>
+        <p:cTn id="1" dur="indefinite" restart="never" nodeType="tmRoot"/>
+      </p:par>
+    </p:tnLst>
+  </p:timing>
 </p:sld>
 </file>
 
@@ -5496,6 +5524,13 @@
   <p:clrMapOvr>
     <a:masterClrMapping/>
   </p:clrMapOvr>
+  <p:timing>
+    <p:tnLst>
+      <p:par>
+        <p:cTn id="1" dur="indefinite" restart="never" nodeType="tmRoot"/>
+      </p:par>
+    </p:tnLst>
+  </p:timing>
 </p:sld>
 </file>
 
@@ -5611,6 +5646,13 @@
   <p:clrMapOvr>
     <a:masterClrMapping/>
   </p:clrMapOvr>
+  <p:timing>
+    <p:tnLst>
+      <p:par>
+        <p:cTn id="1" dur="indefinite" restart="never" nodeType="tmRoot"/>
+      </p:par>
+    </p:tnLst>
+  </p:timing>
 </p:sld>
 </file>
 
@@ -5664,6 +5706,13 @@
   <p:clrMapOvr>
     <a:masterClrMapping/>
   </p:clrMapOvr>
+  <p:timing>
+    <p:tnLst>
+      <p:par>
+        <p:cTn id="1" dur="indefinite" restart="never" nodeType="tmRoot"/>
+      </p:par>
+    </p:tnLst>
+  </p:timing>
 </p:sld>
 </file>
 
@@ -5788,6 +5837,13 @@
   <p:clrMapOvr>
     <a:masterClrMapping/>
   </p:clrMapOvr>
+  <p:timing>
+    <p:tnLst>
+      <p:par>
+        <p:cTn id="1" dur="indefinite" restart="never" nodeType="tmRoot"/>
+      </p:par>
+    </p:tnLst>
+  </p:timing>
 </p:sld>
 </file>
 
@@ -5909,6 +5965,13 @@
   <p:clrMapOvr>
     <a:masterClrMapping/>
   </p:clrMapOvr>
+  <p:timing>
+    <p:tnLst>
+      <p:par>
+        <p:cTn id="1" dur="indefinite" restart="never" nodeType="tmRoot"/>
+      </p:par>
+    </p:tnLst>
+  </p:timing>
 </p:sld>
 </file>
 
@@ -6070,6 +6133,13 @@
   <p:clrMapOvr>
     <a:masterClrMapping/>
   </p:clrMapOvr>
+  <p:timing>
+    <p:tnLst>
+      <p:par>
+        <p:cTn id="1" dur="indefinite" restart="never" nodeType="tmRoot"/>
+      </p:par>
+    </p:tnLst>
+  </p:timing>
 </p:sld>
 </file>
 
@@ -6218,6 +6288,13 @@
   <p:clrMapOvr>
     <a:masterClrMapping/>
   </p:clrMapOvr>
+  <p:timing>
+    <p:tnLst>
+      <p:par>
+        <p:cTn id="1" dur="indefinite" restart="never" nodeType="tmRoot"/>
+      </p:par>
+    </p:tnLst>
+  </p:timing>
 </p:sld>
 </file>
 
@@ -6323,6 +6400,13 @@
   <p:clrMapOvr>
     <a:masterClrMapping/>
   </p:clrMapOvr>
+  <p:timing>
+    <p:tnLst>
+      <p:par>
+        <p:cTn id="1" dur="indefinite" restart="never" nodeType="tmRoot"/>
+      </p:par>
+    </p:tnLst>
+  </p:timing>
 </p:sld>
 </file>
 
@@ -7159,6 +7243,13 @@
   <p:clrMapOvr>
     <a:masterClrMapping/>
   </p:clrMapOvr>
+  <p:timing>
+    <p:tnLst>
+      <p:par>
+        <p:cTn id="1" dur="indefinite" restart="never" nodeType="tmRoot"/>
+      </p:par>
+    </p:tnLst>
+  </p:timing>
 </p:sld>
 </file>
 
@@ -7308,6 +7399,13 @@
   <p:clrMapOvr>
     <a:masterClrMapping/>
   </p:clrMapOvr>
+  <p:timing>
+    <p:tnLst>
+      <p:par>
+        <p:cTn id="1" dur="indefinite" restart="never" nodeType="tmRoot"/>
+      </p:par>
+    </p:tnLst>
+  </p:timing>
 </p:sld>
 </file>
 
@@ -7447,6 +7545,13 @@
   <p:clrMapOvr>
     <a:masterClrMapping/>
   </p:clrMapOvr>
+  <p:timing>
+    <p:tnLst>
+      <p:par>
+        <p:cTn id="1" dur="indefinite" restart="never" nodeType="tmRoot"/>
+      </p:par>
+    </p:tnLst>
+  </p:timing>
 </p:sld>
 </file>
 
@@ -7500,6 +7605,13 @@
   <p:clrMapOvr>
     <a:masterClrMapping/>
   </p:clrMapOvr>
+  <p:timing>
+    <p:tnLst>
+      <p:par>
+        <p:cTn id="1" dur="indefinite" restart="never" nodeType="tmRoot"/>
+      </p:par>
+    </p:tnLst>
+  </p:timing>
 </p:sld>
 </file>
 
@@ -7955,6 +8067,13 @@
   <p:clrMapOvr>
     <a:masterClrMapping/>
   </p:clrMapOvr>
+  <p:timing>
+    <p:tnLst>
+      <p:par>
+        <p:cTn id="1" dur="indefinite" restart="never" nodeType="tmRoot"/>
+      </p:par>
+    </p:tnLst>
+  </p:timing>
 </p:sld>
 </file>
 
@@ -8101,6 +8220,13 @@
   <p:clrMapOvr>
     <a:masterClrMapping/>
   </p:clrMapOvr>
+  <p:timing>
+    <p:tnLst>
+      <p:par>
+        <p:cTn id="1" dur="indefinite" restart="never" nodeType="tmRoot"/>
+      </p:par>
+    </p:tnLst>
+  </p:timing>
 </p:sld>
 </file>
 
@@ -8268,6 +8394,13 @@
   <p:clrMapOvr>
     <a:masterClrMapping/>
   </p:clrMapOvr>
+  <p:timing>
+    <p:tnLst>
+      <p:par>
+        <p:cTn id="1" dur="indefinite" restart="never" nodeType="tmRoot"/>
+      </p:par>
+    </p:tnLst>
+  </p:timing>
 </p:sld>
 </file>
 
@@ -8421,6 +8554,13 @@
   <p:clrMapOvr>
     <a:masterClrMapping/>
   </p:clrMapOvr>
+  <p:timing>
+    <p:tnLst>
+      <p:par>
+        <p:cTn id="1" dur="indefinite" restart="never" nodeType="tmRoot"/>
+      </p:par>
+    </p:tnLst>
+  </p:timing>
 </p:sld>
 </file>
 
@@ -8618,6 +8758,13 @@
   <p:clrMapOvr>
     <a:masterClrMapping/>
   </p:clrMapOvr>
+  <p:timing>
+    <p:tnLst>
+      <p:par>
+        <p:cTn id="1" dur="indefinite" restart="never" nodeType="tmRoot"/>
+      </p:par>
+    </p:tnLst>
+  </p:timing>
 </p:sld>
 </file>
 
@@ -8881,6 +9028,13 @@
   <p:clrMapOvr>
     <a:masterClrMapping/>
   </p:clrMapOvr>
+  <p:timing>
+    <p:tnLst>
+      <p:par>
+        <p:cTn id="1" dur="indefinite" restart="never" nodeType="tmRoot"/>
+      </p:par>
+    </p:tnLst>
+  </p:timing>
 </p:sld>
 </file>
 
@@ -9076,6 +9230,13 @@
   <p:clrMapOvr>
     <a:masterClrMapping/>
   </p:clrMapOvr>
+  <p:timing>
+    <p:tnLst>
+      <p:par>
+        <p:cTn id="1" dur="indefinite" restart="never" nodeType="tmRoot"/>
+      </p:par>
+    </p:tnLst>
+  </p:timing>
 </p:sld>
 </file>
 
@@ -9246,6 +9407,13 @@
   <p:clrMapOvr>
     <a:masterClrMapping/>
   </p:clrMapOvr>
+  <p:timing>
+    <p:tnLst>
+      <p:par>
+        <p:cTn id="1" dur="indefinite" restart="never" nodeType="tmRoot"/>
+      </p:par>
+    </p:tnLst>
+  </p:timing>
 </p:sld>
 </file>
 
@@ -9583,6 +9751,13 @@
   <p:clrMapOvr>
     <a:masterClrMapping/>
   </p:clrMapOvr>
+  <p:timing>
+    <p:tnLst>
+      <p:par>
+        <p:cTn id="1" dur="indefinite" restart="never" nodeType="tmRoot"/>
+      </p:par>
+    </p:tnLst>
+  </p:timing>
 </p:sld>
 </file>
 
@@ -9692,6 +9867,13 @@
   <p:clrMapOvr>
     <a:masterClrMapping/>
   </p:clrMapOvr>
+  <p:timing>
+    <p:tnLst>
+      <p:par>
+        <p:cTn id="1" dur="indefinite" restart="never" nodeType="tmRoot"/>
+      </p:par>
+    </p:tnLst>
+  </p:timing>
 </p:sld>
 </file>
 
@@ -9860,6 +10042,13 @@
   <p:clrMapOvr>
     <a:masterClrMapping/>
   </p:clrMapOvr>
+  <p:timing>
+    <p:tnLst>
+      <p:par>
+        <p:cTn id="1" dur="indefinite" restart="never" nodeType="tmRoot"/>
+      </p:par>
+    </p:tnLst>
+  </p:timing>
 </p:sld>
 </file>
 
@@ -10136,6 +10325,13 @@
   <p:clrMapOvr>
     <a:masterClrMapping/>
   </p:clrMapOvr>
+  <p:timing>
+    <p:tnLst>
+      <p:par>
+        <p:cTn id="1" dur="indefinite" restart="never" nodeType="tmRoot"/>
+      </p:par>
+    </p:tnLst>
+  </p:timing>
 </p:sld>
 </file>
 
@@ -10341,6 +10537,13 @@
   <p:clrMapOvr>
     <a:masterClrMapping/>
   </p:clrMapOvr>
+  <p:timing>
+    <p:tnLst>
+      <p:par>
+        <p:cTn id="1" dur="indefinite" restart="never" nodeType="tmRoot"/>
+      </p:par>
+    </p:tnLst>
+  </p:timing>
 </p:sld>
 </file>
 
@@ -10764,6 +10967,13 @@
   <p:clrMapOvr>
     <a:masterClrMapping/>
   </p:clrMapOvr>
+  <p:timing>
+    <p:tnLst>
+      <p:par>
+        <p:cTn id="1" dur="indefinite" restart="never" nodeType="tmRoot"/>
+      </p:par>
+    </p:tnLst>
+  </p:timing>
 </p:sld>
 </file>
 
@@ -10846,6 +11056,13 @@
   <p:clrMapOvr>
     <a:masterClrMapping/>
   </p:clrMapOvr>
+  <p:timing>
+    <p:tnLst>
+      <p:par>
+        <p:cTn id="1" dur="indefinite" restart="never" nodeType="tmRoot"/>
+      </p:par>
+    </p:tnLst>
+  </p:timing>
 </p:sld>
 </file>
 
@@ -10889,34 +11106,15 @@
           </a:p>
         </p:txBody>
       </p:sp>
-      <p:sp>
-        <p:nvSpPr>
-          <p:cNvPr id="3" name="Content Placeholder 2"/>
-          <p:cNvSpPr>
-            <a:spLocks noGrp="1"/>
-          </p:cNvSpPr>
-          <p:nvPr>
-            <p:ph idx="1"/>
-          </p:nvPr>
-        </p:nvSpPr>
-        <p:spPr/>
-        <p:txBody>
-          <a:bodyPr/>
-          <a:lstStyle/>
-          <a:p>
-            <a:endParaRPr lang="en-CA" dirty="0"/>
-          </a:p>
-        </p:txBody>
-      </p:sp>
       <p:pic>
         <p:nvPicPr>
-          <p:cNvPr id="1026" name="Picture 2"/>
+          <p:cNvPr id="4" name="Picture 2"/>
           <p:cNvPicPr>
             <a:picLocks noChangeAspect="1" noChangeArrowheads="1"/>
           </p:cNvPicPr>
           <p:nvPr/>
         </p:nvPicPr>
-        <p:blipFill rotWithShape="1">
+        <p:blipFill>
           <a:blip r:embed="rId2">
             <a:extLst>
               <a:ext uri="{28A0092B-C50C-407E-A947-70E740481C1C}">
@@ -10924,13 +11122,15 @@
               </a:ext>
             </a:extLst>
           </a:blip>
-          <a:srcRect r="17819"/>
-          <a:stretch/>
+          <a:srcRect/>
+          <a:stretch>
+            <a:fillRect/>
+          </a:stretch>
         </p:blipFill>
         <p:spPr bwMode="auto">
           <a:xfrm>
-            <a:off x="1404448" y="1052736"/>
-            <a:ext cx="7200000" cy="5688632"/>
+            <a:off x="1331640" y="1124743"/>
+            <a:ext cx="7272808" cy="5424161"/>
           </a:xfrm>
           <a:prstGeom prst="rect">
             <a:avLst/>
@@ -10980,6 +11180,13 @@
   <p:clrMapOvr>
     <a:masterClrMapping/>
   </p:clrMapOvr>
+  <p:timing>
+    <p:tnLst>
+      <p:par>
+        <p:cTn id="1" dur="indefinite" restart="never" nodeType="tmRoot"/>
+      </p:par>
+    </p:tnLst>
+  </p:timing>
 </p:sld>
 </file>
 
@@ -11116,6 +11323,13 @@
   <p:clrMapOvr>
     <a:masterClrMapping/>
   </p:clrMapOvr>
+  <p:timing>
+    <p:tnLst>
+      <p:par>
+        <p:cTn id="1" dur="indefinite" restart="never" nodeType="tmRoot"/>
+      </p:par>
+    </p:tnLst>
+  </p:timing>
 </p:sld>
 </file>
 
@@ -11252,6 +11466,13 @@
   <p:clrMapOvr>
     <a:masterClrMapping/>
   </p:clrMapOvr>
+  <p:timing>
+    <p:tnLst>
+      <p:par>
+        <p:cTn id="1" dur="indefinite" restart="never" nodeType="tmRoot"/>
+      </p:par>
+    </p:tnLst>
+  </p:timing>
 </p:sld>
 </file>
 
@@ -11295,28 +11516,9 @@
           </a:p>
         </p:txBody>
       </p:sp>
-      <p:sp>
-        <p:nvSpPr>
-          <p:cNvPr id="3" name="Content Placeholder 2"/>
-          <p:cNvSpPr>
-            <a:spLocks noGrp="1"/>
-          </p:cNvSpPr>
-          <p:nvPr>
-            <p:ph idx="1"/>
-          </p:nvPr>
-        </p:nvSpPr>
-        <p:spPr/>
-        <p:txBody>
-          <a:bodyPr/>
-          <a:lstStyle/>
-          <a:p>
-            <a:endParaRPr lang="en-CA" dirty="0"/>
-          </a:p>
-        </p:txBody>
-      </p:sp>
       <p:pic>
         <p:nvPicPr>
-          <p:cNvPr id="4098" name="Picture 2"/>
+          <p:cNvPr id="2051" name="Picture 3"/>
           <p:cNvPicPr>
             <a:picLocks noChangeAspect="1" noChangeArrowheads="1"/>
           </p:cNvPicPr>
@@ -11337,8 +11539,8 @@
         </p:blipFill>
         <p:spPr bwMode="auto">
           <a:xfrm>
-            <a:off x="1166813" y="1178049"/>
-            <a:ext cx="8001228" cy="2899023"/>
+            <a:off x="1331639" y="1196752"/>
+            <a:ext cx="7539027" cy="4320480"/>
           </a:xfrm>
           <a:prstGeom prst="rect">
             <a:avLst/>
@@ -11577,6 +11779,13 @@
   <p:clrMapOvr>
     <a:masterClrMapping/>
   </p:clrMapOvr>
+  <p:timing>
+    <p:tnLst>
+      <p:par>
+        <p:cTn id="1" dur="indefinite" restart="never" nodeType="tmRoot"/>
+      </p:par>
+    </p:tnLst>
+  </p:timing>
 </p:sld>
 </file>
 
@@ -12948,6 +13157,13 @@
   <p:clrMapOvr>
     <a:masterClrMapping/>
   </p:clrMapOvr>
+  <p:timing>
+    <p:tnLst>
+      <p:par>
+        <p:cTn id="1" dur="indefinite" restart="never" nodeType="tmRoot"/>
+      </p:par>
+    </p:tnLst>
+  </p:timing>
 </p:sld>
 </file>
 
@@ -14192,6 +14408,13 @@
   <p:clrMapOvr>
     <a:masterClrMapping/>
   </p:clrMapOvr>
+  <p:timing>
+    <p:tnLst>
+      <p:par>
+        <p:cTn id="1" dur="indefinite" restart="never" nodeType="tmRoot"/>
+      </p:par>
+    </p:tnLst>
+  </p:timing>
 </p:sld>
 </file>
 
@@ -14734,7 +14957,7 @@
           <a:p>
             <a:fld id="{3E35911F-C29B-46BC-A997-389E14454876}" type="datetime1">
               <a:rPr lang="en-US" smtClean="0"/>
-              <a:t>8/29/2012</a:t>
+              <a:t>9/9/2012</a:t>
             </a:fld>
             <a:endParaRPr lang="en-US" dirty="0"/>
           </a:p>
@@ -15476,6 +15699,13 @@
   <p:clrMapOvr>
     <a:masterClrMapping/>
   </p:clrMapOvr>
+  <p:timing>
+    <p:tnLst>
+      <p:par>
+        <p:cTn id="1" dur="indefinite" restart="never" nodeType="tmRoot"/>
+      </p:par>
+    </p:tnLst>
+  </p:timing>
 </p:sld>
 </file>
 
@@ -15797,6 +16027,13 @@
   <p:clrMapOvr>
     <a:masterClrMapping/>
   </p:clrMapOvr>
+  <p:timing>
+    <p:tnLst>
+      <p:par>
+        <p:cTn id="1" dur="indefinite" restart="never" nodeType="tmRoot"/>
+      </p:par>
+    </p:tnLst>
+  </p:timing>
 </p:sld>
 </file>
 

</xml_diff>